<commit_message>
Third week second revision
</commit_message>
<xml_diff>
--- a/PPT/Week_3_1.pptx
+++ b/PPT/Week_3_1.pptx
@@ -324,7 +324,7 @@
           <a:p>
             <a:fld id="{1D8BD707-D9CF-40AE-B4C6-C98DA3205C09}" type="datetimeFigureOut">
               <a:rPr lang="en-US"/>
-              <a:t>8/2/2017</a:t>
+              <a:t>8/4/2017</a:t>
             </a:fld>
             <a:endParaRPr lang="en-US"/>
           </a:p>
@@ -531,7 +531,7 @@
           <a:p>
             <a:fld id="{1D8BD707-D9CF-40AE-B4C6-C98DA3205C09}" type="datetimeFigureOut">
               <a:rPr lang="en-US"/>
-              <a:t>8/2/2017</a:t>
+              <a:t>8/4/2017</a:t>
             </a:fld>
             <a:endParaRPr lang="en-US"/>
           </a:p>
@@ -781,7 +781,7 @@
           <a:p>
             <a:fld id="{1D8BD707-D9CF-40AE-B4C6-C98DA3205C09}" type="datetimeFigureOut">
               <a:rPr lang="en-US"/>
-              <a:t>8/2/2017</a:t>
+              <a:t>8/4/2017</a:t>
             </a:fld>
             <a:endParaRPr lang="en-US"/>
           </a:p>
@@ -965,7 +965,7 @@
           <a:p>
             <a:fld id="{1D8BD707-D9CF-40AE-B4C6-C98DA3205C09}" type="datetimeFigureOut">
               <a:rPr lang="en-US"/>
-              <a:t>8/2/2017</a:t>
+              <a:t>8/4/2017</a:t>
             </a:fld>
             <a:endParaRPr lang="en-US"/>
           </a:p>
@@ -1120,7 +1120,7 @@
           <a:p>
             <a:fld id="{1D8BD707-D9CF-40AE-B4C6-C98DA3205C09}" type="datetimeFigureOut">
               <a:rPr lang="en-US"/>
-              <a:t>8/2/2017</a:t>
+              <a:t>8/4/2017</a:t>
             </a:fld>
             <a:endParaRPr lang="en-US"/>
           </a:p>
@@ -1375,7 +1375,7 @@
           <a:p>
             <a:fld id="{1D8BD707-D9CF-40AE-B4C6-C98DA3205C09}" type="datetimeFigureOut">
               <a:rPr lang="en-US"/>
-              <a:t>8/2/2017</a:t>
+              <a:t>8/4/2017</a:t>
             </a:fld>
             <a:endParaRPr lang="en-US"/>
           </a:p>
@@ -10641,8 +10641,8 @@
           </a:p>
         </p:txBody>
       </p:sp>
-      <mc:AlternateContent xmlns:mc="http://schemas.openxmlformats.org/markup-compatibility/2006">
-        <mc:Choice xmlns:a14="http://schemas.microsoft.com/office/drawing/2010/main" Requires="a14">
+      <mc:AlternateContent xmlns:mc="http://schemas.openxmlformats.org/markup-compatibility/2006" xmlns:a14="http://schemas.microsoft.com/office/drawing/2010/main">
+        <mc:Choice Requires="a14">
           <p:sp>
             <p:nvSpPr>
               <p:cNvPr id="6" name="矩形 5"/>
@@ -10832,7 +10832,7 @@
             </p:txBody>
           </p:sp>
         </mc:Choice>
-        <mc:Fallback>
+        <mc:Fallback xmlns="">
           <p:sp>
             <p:nvSpPr>
               <p:cNvPr id="6" name="矩形 5"/>
@@ -12298,11 +12298,15 @@
             </a:pPr>
             <a:r>
               <a:rPr lang="zh-CN" altLang="en-US" spc="-5" dirty="0" smtClean="0"/>
-              <a:t>     矩阵</a:t>
+              <a:t>     </a:t>
+            </a:r>
+            <a:r>
+              <a:rPr lang="zh-CN" altLang="en-US" spc="-5" dirty="0" smtClean="0"/>
+              <a:t>矩阵</a:t>
             </a:r>
             <a:r>
               <a:rPr lang="zh-CN" altLang="en-US" spc="-5" dirty="0"/>
-              <a:t>轮换</a:t>
+              <a:t>旋转</a:t>
             </a:r>
             <a:endParaRPr spc="-5" dirty="0"/>
           </a:p>
@@ -12466,8 +12470,8 @@
           </a:prstGeom>
         </p:spPr>
       </p:pic>
-      <mc:AlternateContent xmlns:mc="http://schemas.openxmlformats.org/markup-compatibility/2006">
-        <mc:Choice xmlns:a14="http://schemas.microsoft.com/office/drawing/2010/main" Requires="a14">
+      <mc:AlternateContent xmlns:mc="http://schemas.openxmlformats.org/markup-compatibility/2006" xmlns:a14="http://schemas.microsoft.com/office/drawing/2010/main">
+        <mc:Choice Requires="a14">
           <p:sp>
             <p:nvSpPr>
               <p:cNvPr id="8" name="矩形 7"/>
@@ -12535,7 +12539,7 @@
             </p:txBody>
           </p:sp>
         </mc:Choice>
-        <mc:Fallback>
+        <mc:Fallback xmlns="">
           <p:sp>
             <p:nvSpPr>
               <p:cNvPr id="8" name="矩形 7"/>
@@ -12691,7 +12695,7 @@
               </a:rPr>
               <a:t>Taylor</a:t>
             </a:r>
-            <a:endParaRPr sz="6000">
+            <a:endParaRPr sz="6000" dirty="0">
               <a:latin typeface="Gill Sans MT"/>
               <a:cs typeface="Gill Sans MT"/>
             </a:endParaRPr>
@@ -12706,7 +12710,7 @@
         </p:nvSpPr>
         <p:spPr>
           <a:xfrm>
-            <a:off x="1546577" y="867610"/>
+            <a:off x="1545021" y="685800"/>
             <a:ext cx="9237875" cy="5196304"/>
           </a:xfrm>
           <a:prstGeom prst="rect">

</xml_diff>